<commit_message>
poster probably definitely final
</commit_message>
<xml_diff>
--- a/poster/poster_hql 2.pptx
+++ b/poster/poster_hql 2.pptx
@@ -1600,7 +1600,7 @@
         </p:nvSpPr>
         <p:spPr>
           <a:xfrm>
-            <a:off x="17233900" y="38823900"/>
+            <a:off x="17233900" y="39065200"/>
             <a:ext cx="15163800" cy="4229100"/>
           </a:xfrm>
           <a:prstGeom prst="roundRect">
@@ -1650,12 +1650,12 @@
         </p:nvSpPr>
         <p:spPr>
           <a:xfrm>
-            <a:off x="17157700" y="31635700"/>
-            <a:ext cx="15300341" cy="5803900"/>
+            <a:off x="17157700" y="32829500"/>
+            <a:ext cx="15300341" cy="4902200"/>
           </a:xfrm>
           <a:prstGeom prst="roundRect">
             <a:avLst>
-              <a:gd name="adj" fmla="val 4511"/>
+              <a:gd name="adj" fmla="val 5340"/>
             </a:avLst>
           </a:prstGeom>
           <a:solidFill>
@@ -1692,11 +1692,11 @@
         <p:spPr>
           <a:xfrm>
             <a:off x="17284700" y="16370300"/>
-            <a:ext cx="15163800" cy="13817600"/>
+            <a:ext cx="15163800" cy="15100300"/>
           </a:xfrm>
           <a:prstGeom prst="roundRect">
             <a:avLst>
-              <a:gd name="adj" fmla="val 3421"/>
+              <a:gd name="adj" fmla="val 3131"/>
             </a:avLst>
           </a:prstGeom>
           <a:solidFill>
@@ -1742,11 +1742,11 @@
         <p:spPr>
           <a:xfrm>
             <a:off x="17259300" y="5029200"/>
-            <a:ext cx="15163800" cy="9740900"/>
+            <a:ext cx="15163800" cy="10071100"/>
           </a:xfrm>
           <a:prstGeom prst="roundRect">
             <a:avLst>
-              <a:gd name="adj" fmla="val 4853"/>
+              <a:gd name="adj" fmla="val 4694"/>
             </a:avLst>
           </a:prstGeom>
           <a:solidFill>
@@ -2001,7 +2001,7 @@
             </a:r>
             <a:r>
               <a:rPr baseline="31999"/>
-              <a:t>2</a:t>
+              <a:t>3</a:t>
             </a:r>
             <a:endParaRPr sz="13400"/>
           </a:p>
@@ -2060,8 +2060,8 @@
         </p:nvSpPr>
         <p:spPr>
           <a:xfrm>
-            <a:off x="660400" y="5539997"/>
-            <a:ext cx="15300341" cy="16408401"/>
+            <a:off x="723900" y="5489197"/>
+            <a:ext cx="15300341" cy="15481301"/>
           </a:xfrm>
           <a:prstGeom prst="roundRect">
             <a:avLst>
@@ -2146,7 +2146,7 @@
         </p:nvSpPr>
         <p:spPr>
           <a:xfrm>
-            <a:off x="17221200" y="30652197"/>
+            <a:off x="17221200" y="31845997"/>
             <a:ext cx="15176500" cy="1199541"/>
           </a:xfrm>
           <a:prstGeom prst="roundRect">
@@ -2189,7 +2189,7 @@
         </p:nvSpPr>
         <p:spPr>
           <a:xfrm>
-            <a:off x="17678400" y="30875668"/>
+            <a:off x="17678400" y="32069468"/>
             <a:ext cx="13817962" cy="636979"/>
           </a:xfrm>
           <a:prstGeom prst="rect">
@@ -2237,8 +2237,8 @@
         </p:nvSpPr>
         <p:spPr>
           <a:xfrm>
-            <a:off x="17673699" y="32154313"/>
-            <a:ext cx="14236701" cy="4892041"/>
+            <a:off x="17673699" y="33348113"/>
+            <a:ext cx="14236701" cy="3858261"/>
           </a:xfrm>
           <a:prstGeom prst="rect">
             <a:avLst/>
@@ -2259,6 +2259,9 @@
           <a:lstStyle/>
           <a:p>
             <a:pPr marL="240631" indent="-240631">
+              <a:lnSpc>
+                <a:spcPct val="120000"/>
+              </a:lnSpc>
               <a:spcBef>
                 <a:spcPts val="600"/>
               </a:spcBef>
@@ -2272,11 +2275,14 @@
               </a:defRPr>
             </a:pPr>
             <a:r>
-              <a:t>We have implemented the HHL algorithm and successfully integrated it with NVIDIA's cuQuantum SDK.</a:t>
+              <a:t>We have implemented the HHL algorithm successfully for diagonal, diagonal with irrational eigenvalues and randomly generated hermitian positive definite matrices.</a:t>
             </a:r>
           </a:p>
           <a:p>
             <a:pPr marL="240631" indent="-240631">
+              <a:lnSpc>
+                <a:spcPct val="120000"/>
+              </a:lnSpc>
               <a:spcBef>
                 <a:spcPts val="600"/>
               </a:spcBef>
@@ -2290,11 +2296,14 @@
               </a:defRPr>
             </a:pPr>
             <a:r>
-              <a:t>We have demonstrated speedups in the quantum simulation of the HHL algorithm using cuQuantum for sparse matrices.</a:t>
+              <a:t>We have demonstrated speedups for HHL algorithm using V100 and A100 GPUs.</a:t>
             </a:r>
           </a:p>
           <a:p>
             <a:pPr marL="240631" indent="-240631">
+              <a:lnSpc>
+                <a:spcPct val="120000"/>
+              </a:lnSpc>
               <a:spcBef>
                 <a:spcPts val="600"/>
               </a:spcBef>
@@ -2308,11 +2317,14 @@
               </a:defRPr>
             </a:pPr>
             <a:r>
-              <a:t>We have found that the percentage speedups increase with system size, a fact that we will exploit in increasing the scalability of the implementation.</a:t>
+              <a:t>We have found that the percentage speedups increase with system size.</a:t>
             </a:r>
           </a:p>
           <a:p>
             <a:pPr marL="240631" indent="-240631">
+              <a:lnSpc>
+                <a:spcPct val="120000"/>
+              </a:lnSpc>
               <a:spcBef>
                 <a:spcPts val="600"/>
               </a:spcBef>
@@ -2326,29 +2338,14 @@
               </a:defRPr>
             </a:pPr>
             <a:r>
-              <a:t>Our implementation of the HHL algorithm is so far compatible with nearly sparse hermitian positive definite matrices with random eigenvalues.</a:t>
+              <a:t>We plan to optimise it further to extend it's compatibility to dense matrices that possess highly entangled eigensystems and to scale it for larger systems.</a:t>
             </a:r>
           </a:p>
           <a:p>
             <a:pPr marL="240631" indent="-240631">
-              <a:spcBef>
-                <a:spcPts val="600"/>
-              </a:spcBef>
-              <a:buSzPct val="100000"/>
-              <a:buChar char="•"/>
-              <a:defRPr>
-                <a:latin typeface="+mn-lt"/>
-                <a:ea typeface="+mn-ea"/>
-                <a:cs typeface="+mn-cs"/>
-                <a:sym typeface="Helvetica"/>
-              </a:defRPr>
-            </a:pPr>
-            <a:r>
-              <a:t>We plan to optimise it further to extend it's compatibility to dense matrices that possess highly entangled eigensystems.</a:t>
-            </a:r>
-          </a:p>
-          <a:p>
-            <a:pPr marL="240631" indent="-240631">
+              <a:lnSpc>
+                <a:spcPct val="120000"/>
+              </a:lnSpc>
               <a:spcBef>
                 <a:spcPts val="600"/>
               </a:spcBef>
@@ -2375,7 +2372,7 @@
         </p:nvSpPr>
         <p:spPr>
           <a:xfrm>
-            <a:off x="17675042" y="39370065"/>
+            <a:off x="17675042" y="39611365"/>
             <a:ext cx="13945128" cy="3406141"/>
           </a:xfrm>
           <a:prstGeom prst="rect">
@@ -2450,7 +2447,7 @@
         </p:nvSpPr>
         <p:spPr>
           <a:xfrm>
-            <a:off x="17221200" y="37902576"/>
+            <a:off x="17221200" y="38143876"/>
             <a:ext cx="15176500" cy="1199541"/>
           </a:xfrm>
           <a:prstGeom prst="roundRect">
@@ -2493,7 +2490,7 @@
         </p:nvSpPr>
         <p:spPr>
           <a:xfrm>
-            <a:off x="17678400" y="38183576"/>
+            <a:off x="17678400" y="38424876"/>
             <a:ext cx="13817962" cy="637541"/>
           </a:xfrm>
           <a:prstGeom prst="rect">
@@ -2709,12 +2706,12 @@
         </p:nvSpPr>
         <p:spPr>
           <a:xfrm>
-            <a:off x="723900" y="23495000"/>
-            <a:ext cx="15163800" cy="12268200"/>
+            <a:off x="723900" y="22809200"/>
+            <a:ext cx="15163800" cy="12649200"/>
           </a:xfrm>
           <a:prstGeom prst="roundRect">
             <a:avLst>
-              <a:gd name="adj" fmla="val 3853"/>
+              <a:gd name="adj" fmla="val 3737"/>
             </a:avLst>
           </a:prstGeom>
           <a:solidFill>
@@ -2759,7 +2756,7 @@
         </p:nvSpPr>
         <p:spPr>
           <a:xfrm>
-            <a:off x="723900" y="22590475"/>
+            <a:off x="723900" y="21904675"/>
             <a:ext cx="15176500" cy="1199541"/>
           </a:xfrm>
           <a:prstGeom prst="roundRect">
@@ -2802,7 +2799,7 @@
         </p:nvSpPr>
         <p:spPr>
           <a:xfrm>
-            <a:off x="987165" y="22839346"/>
+            <a:off x="987165" y="22153546"/>
             <a:ext cx="13817962" cy="637541"/>
           </a:xfrm>
           <a:prstGeom prst="rect">
@@ -2844,14 +2841,14 @@
       </p:sp>
       <p:sp>
         <p:nvSpPr>
-          <p:cNvPr id="54" name="We have tested the HHL algorithm for various matrix sizes and complexities. All runs were conducted first using only CPU capabilities, and then using V100 and A100 NVIDIA GPUs - where we expect the cuQuantum SDK to speed up the simulation of the quantum "/>
+          <p:cNvPr id="54" name="We begin with systems where the problem matrix is diagonal with entries corresponding to binary fractions upto a multiplicative constant. Such matrices were used to verify that the implementation was satisfactory. We have tested the HHL algorithm for var"/>
           <p:cNvSpPr txBox="1"/>
           <p:nvPr/>
         </p:nvSpPr>
         <p:spPr>
           <a:xfrm>
-            <a:off x="990600" y="24396700"/>
-            <a:ext cx="13931900" cy="3245166"/>
+            <a:off x="990600" y="23710900"/>
+            <a:ext cx="13931900" cy="2212219"/>
           </a:xfrm>
           <a:prstGeom prst="rect">
             <a:avLst/>
@@ -2869,9 +2866,8 @@
           <a:bodyPr lIns="45719" rIns="45719">
             <a:spAutoFit/>
           </a:bodyPr>
-          <a:lstStyle/>
-          <a:p>
-            <a:pPr>
+          <a:lstStyle>
+            <a:lvl1pPr>
               <a:lnSpc>
                 <a:spcPct val="120000"/>
               </a:lnSpc>
@@ -2884,32 +2880,12 @@
                 <a:cs typeface="Helvetica Neue"/>
                 <a:sym typeface="Helvetica Neue"/>
               </a:defRPr>
-            </a:pPr>
+            </a:lvl1pPr>
+          </a:lstStyle>
+          <a:p>
+            <a:pPr/>
             <a:r>
-              <a:t>We have tested the HHL algorithm for various matrix sizes and complexities. All runs were conducted first using only CPU capabilities, and then using V100 and A100 NVIDIA GPUs - where we expect the cuQuantum SDK to speed up the simulation of the quantum  circuit.</a:t>
-            </a:r>
-          </a:p>
-          <a:p>
-            <a:pPr>
-              <a:defRPr>
-                <a:latin typeface="Helvetica Neue"/>
-                <a:ea typeface="Helvetica Neue"/>
-                <a:cs typeface="Helvetica Neue"/>
-                <a:sym typeface="Helvetica Neue"/>
-              </a:defRPr>
-            </a:pPr>
-          </a:p>
-          <a:p>
-            <a:pPr>
-              <a:defRPr>
-                <a:latin typeface="Helvetica Neue"/>
-                <a:ea typeface="Helvetica Neue"/>
-                <a:cs typeface="Helvetica Neue"/>
-                <a:sym typeface="Helvetica Neue"/>
-              </a:defRPr>
-            </a:pPr>
-            <a:r>
-              <a:t>We begin with systems where the matrix A is diagonal with entries corresponding to binary fractions upto a multiplicative constant. Such matrices were used to verify the that the implementation was satisfactory and that cuQuantum was able to use GPUs to speedup the runs.. A table of times taken for such runs is presented below.  </a:t>
+              <a:t>We begin with systems where the problem matrix is diagonal with entries corresponding to binary fractions upto a multiplicative constant. Such matrices were used to verify that the implementation was satisfactory. We have tested the HHL algorithm for various matrix sizes and complexities. All runs were conducted first using only CPU capabilities, and then using V100 (32 GB) and A100 (80 GB) NVIDIA GPUs. The table and plot below shows the times taken in executing HHL for such matrices.</a:t>
             </a:r>
           </a:p>
         </p:txBody>
@@ -3148,7 +3124,7 @@
       </p:sp>
       <p:sp>
         <p:nvSpPr>
-          <p:cNvPr id="60" name="After establishing the viability of the implementation and demonstrating the small but visible speedup achieved using cuQuantum, we moved onto testing it on diagonal matrices where the eigenvalues are not handpicked, but generated randomly.…"/>
+          <p:cNvPr id="60" name="After establishing the viability of the implementation and demonstrating the small but visible speedup achieved using cuQuantum, we moved onto testing it on diagonal matrices where the eigenvalues are  generated randomly.…"/>
           <p:cNvSpPr txBox="1"/>
           <p:nvPr/>
         </p:nvSpPr>
@@ -3187,7 +3163,7 @@
               </a:defRPr>
             </a:pPr>
             <a:r>
-              <a:t>After establishing the viability of the implementation and demonstrating the small but visible speedup achieved using cuQuantum, we moved onto testing it on diagonal matrices where the eigenvalues are not handpicked, but generated randomly.</a:t>
+              <a:t>After establishing the viability of the implementation and demonstrating the small but visible speedup achieved using cuQuantum, we moved onto testing it on diagonal matrices where the eigenvalues are  generated randomly.</a:t>
             </a:r>
           </a:p>
           <a:p>
@@ -3216,21 +3192,21 @@
               </a:defRPr>
             </a:pPr>
             <a:r>
-              <a:t>This is expected to interfere with the phase estimation routine in the HHL algorithm, increasing the circuit depth and hence the time taken by the simulation. A table detailing the times taken in such runs is presented opposite.</a:t>
+              <a:t>This is expected to interfere with the phase estimation routine in the HHL algorithm, hence increasing the circuit depth and the time taken by the simulation. A table and plot detailing the times taken in such runs is presented next.</a:t>
             </a:r>
           </a:p>
         </p:txBody>
       </p:sp>
       <p:sp>
         <p:nvSpPr>
-          <p:cNvPr id="61" name="Thus cuQuantum is able to speed up the simulation by upto 5.7%. We can further see that this speedup increases as we increase the size of the problem, which we attribute to the fact that at lower qubits the problem does not utilise all available cores. I"/>
+          <p:cNvPr id="61" name="The table above shows that cuQuantum is able to speed up the simulation by up to 5.7%. We further observe that this speedup increases as we increase the size of the problem, which is due to the fact that at lower qubits the problem does not utilise all a"/>
           <p:cNvSpPr txBox="1"/>
           <p:nvPr/>
         </p:nvSpPr>
         <p:spPr>
           <a:xfrm>
-            <a:off x="17780000" y="10782300"/>
-            <a:ext cx="14211300" cy="3685419"/>
+            <a:off x="17729200" y="11239500"/>
+            <a:ext cx="14211300" cy="3281142"/>
           </a:xfrm>
           <a:prstGeom prst="rect">
             <a:avLst/>
@@ -3262,7 +3238,7 @@
               </a:defRPr>
             </a:pPr>
             <a:r>
-              <a:t>Thus cuQuantum is able to speed up the simulation by upto 5.7%. We can further see that this speedup increases as we increase the size of the problem, which we attribute to the fact that at lower qubits the problem does not utilise all available cores. Indeed it seems that for the smallest system, the CPU run is faster than GPU-enabled runs.</a:t>
+              <a:t>The table above shows that cuQuantum is able to speed up the simulation by up to 5.7%. We further observe that this speedup increases as we increase the size of the problem, which is due to the fact that at lower qubits the problem does not utilise all available cores.</a:t>
             </a:r>
           </a:p>
           <a:p>
@@ -3291,7 +3267,7 @@
               </a:defRPr>
             </a:pPr>
             <a:r>
-              <a:t>On an average we find a speedup of 2.42% using V100 GPUs and 4.52% using A100 GPUs. Another characteristic evident from the date is that while the speedup attained via V100 GPUs appears to stagnate, the A100 speedup appears to still be rising. We will explore this in future work and look at how the speedup scales with system size and number of qubits.</a:t>
+              <a:t>On an average we find a speedup of 2.42% using V100 GPUs and 4.52% using A100 GPUs. Another characteristic evident from the date is that while the speedup attained via V100 GPUs appears to stagnate, the A100 speedup appears to still be rising. We are exploring this further for higher system size and number of qubits.</a:t>
             </a:r>
           </a:p>
         </p:txBody>
@@ -3333,12 +3309,12 @@
         </p:nvSpPr>
         <p:spPr>
           <a:xfrm>
-            <a:off x="1676400" y="28041600"/>
-            <a:ext cx="13246100" cy="4978400"/>
+            <a:off x="1333500" y="26492200"/>
+            <a:ext cx="14071600" cy="5410200"/>
           </a:xfrm>
           <a:prstGeom prst="roundRect">
             <a:avLst>
-              <a:gd name="adj" fmla="val 8782"/>
+              <a:gd name="adj" fmla="val 8081"/>
             </a:avLst>
           </a:prstGeom>
           <a:solidFill>
@@ -3375,175 +3351,16 @@
           </a:p>
         </p:txBody>
       </p:sp>
-      <p:pic>
-        <p:nvPicPr>
-          <p:cNvPr id="64" name="Screenshot_20240123_074018.png" descr="Screenshot_20240123_074018.png"/>
-          <p:cNvPicPr>
-            <a:picLocks noChangeAspect="1"/>
-          </p:cNvPicPr>
-          <p:nvPr/>
-        </p:nvPicPr>
-        <p:blipFill>
-          <a:blip r:embed="rId6">
-            <a:extLst/>
-          </a:blip>
-          <a:stretch>
-            <a:fillRect/>
-          </a:stretch>
-        </p:blipFill>
-        <p:spPr>
-          <a:xfrm>
-            <a:off x="1828800" y="28194000"/>
-            <a:ext cx="12928600" cy="4695498"/>
-          </a:xfrm>
-          <a:prstGeom prst="rect">
-            <a:avLst/>
-          </a:prstGeom>
-          <a:ln w="12700">
-            <a:miter lim="400000"/>
-          </a:ln>
-        </p:spPr>
-      </p:pic>
       <p:sp>
         <p:nvSpPr>
-          <p:cNvPr id="65" name="This serves as a demonstration that the HHL algorithm has been implemented correctly and cuQuantum has been correctly integrated. We now move on to matrices where the eigenvalues are not binary fractions and see how the algorithm fares there."/>
+          <p:cNvPr id="64" name="We checked the results of the simulations by calculating the projection of the obtained result upon the exact solutions. This fidelity was found to average at 0.87 over all conducted runs.…"/>
           <p:cNvSpPr txBox="1"/>
           <p:nvPr/>
         </p:nvSpPr>
         <p:spPr>
           <a:xfrm>
-            <a:off x="990600" y="33731200"/>
-            <a:ext cx="13931900" cy="1331712"/>
-          </a:xfrm>
-          <a:prstGeom prst="rect">
-            <a:avLst/>
-          </a:prstGeom>
-          <a:ln w="12700">
-            <a:miter lim="400000"/>
-          </a:ln>
-          <a:extLst>
-            <a:ext uri="{C572A759-6A51-4108-AA02-DFA0A04FC94B}">
-              <ma14:wrappingTextBoxFlag xmlns:ma14="http://schemas.microsoft.com/office/mac/drawingml/2011/main" val="1"/>
-            </a:ext>
-          </a:extLst>
-        </p:spPr>
-        <p:txBody>
-          <a:bodyPr lIns="45719" rIns="45719">
-            <a:spAutoFit/>
-          </a:bodyPr>
-          <a:lstStyle>
-            <a:lvl1pPr>
-              <a:lnSpc>
-                <a:spcPct val="120000"/>
-              </a:lnSpc>
-              <a:spcBef>
-                <a:spcPts val="600"/>
-              </a:spcBef>
-              <a:defRPr>
-                <a:latin typeface="Helvetica Neue"/>
-                <a:ea typeface="Helvetica Neue"/>
-                <a:cs typeface="Helvetica Neue"/>
-                <a:sym typeface="Helvetica Neue"/>
-              </a:defRPr>
-            </a:lvl1pPr>
-          </a:lstStyle>
-          <a:p>
-            <a:pPr/>
-            <a:r>
-              <a:t>This serves as a demonstration that the HHL algorithm has been implemented correctly and cuQuantum has been correctly integrated. We now move on to matrices where the eigenvalues are not binary fractions and see how the algorithm fares there.</a:t>
-            </a:r>
-          </a:p>
-        </p:txBody>
-      </p:sp>
-      <p:sp>
-        <p:nvSpPr>
-          <p:cNvPr id="66" name="Rounded Rectangle"/>
-          <p:cNvSpPr/>
-          <p:nvPr/>
-        </p:nvSpPr>
-        <p:spPr>
-          <a:xfrm>
-            <a:off x="18161000" y="5575300"/>
-            <a:ext cx="13411200" cy="4826000"/>
-          </a:xfrm>
-          <a:prstGeom prst="roundRect">
-            <a:avLst>
-              <a:gd name="adj" fmla="val 9059"/>
-            </a:avLst>
-          </a:prstGeom>
-          <a:solidFill>
-            <a:srgbClr val="FFFFFF"/>
-          </a:solidFill>
-          <a:ln w="25400">
-            <a:solidFill>
-              <a:schemeClr val="accent1"/>
-            </a:solidFill>
-          </a:ln>
-          <a:effectLst>
-            <a:outerShdw sx="100000" sy="100000" kx="0" ky="0" algn="b" rotWithShape="0" blurRad="38100" dist="23000" dir="5400000">
-              <a:srgbClr val="000000">
-                <a:alpha val="35000"/>
-              </a:srgbClr>
-            </a:outerShdw>
-          </a:effectLst>
-        </p:spPr>
-        <p:txBody>
-          <a:bodyPr lIns="45719" rIns="45719" anchor="ctr"/>
-          <a:lstStyle/>
-          <a:p>
-            <a:pPr algn="ctr">
-              <a:defRPr sz="6500">
-                <a:solidFill>
-                  <a:srgbClr val="FFFFFF"/>
-                </a:solidFill>
-                <a:latin typeface="Arial"/>
-                <a:ea typeface="Arial"/>
-                <a:cs typeface="Arial"/>
-                <a:sym typeface="Arial"/>
-              </a:defRPr>
-            </a:pPr>
-          </a:p>
-        </p:txBody>
-      </p:sp>
-      <p:pic>
-        <p:nvPicPr>
-          <p:cNvPr id="67" name="Screenshot_20240123_075216.png" descr="Screenshot_20240123_075216.png"/>
-          <p:cNvPicPr>
-            <a:picLocks noChangeAspect="1"/>
-          </p:cNvPicPr>
-          <p:nvPr/>
-        </p:nvPicPr>
-        <p:blipFill>
-          <a:blip r:embed="rId7">
-            <a:extLst/>
-          </a:blip>
-          <a:stretch>
-            <a:fillRect/>
-          </a:stretch>
-        </p:blipFill>
-        <p:spPr>
-          <a:xfrm>
-            <a:off x="18373670" y="5689600"/>
-            <a:ext cx="12991922" cy="4522325"/>
-          </a:xfrm>
-          <a:prstGeom prst="rect">
-            <a:avLst/>
-          </a:prstGeom>
-          <a:ln w="12700">
-            <a:miter lim="400000"/>
-          </a:ln>
-        </p:spPr>
-      </p:pic>
-      <p:sp>
-        <p:nvSpPr>
-          <p:cNvPr id="68" name="Again we see that a significant speedup is achieved in GPU-enable runs. Indeed, the average speedups of x% for V100 and x% for A100 are both higher their counterparts in the previous section. This is like due to the increased complexity of the matrix and"/>
-          <p:cNvSpPr txBox="1"/>
-          <p:nvPr/>
-        </p:nvSpPr>
-        <p:spPr>
-          <a:xfrm>
-            <a:off x="17729200" y="25019000"/>
-            <a:ext cx="14236700" cy="4898248"/>
+            <a:off x="990600" y="32270700"/>
+            <a:ext cx="13931900" cy="2804872"/>
           </a:xfrm>
           <a:prstGeom prst="rect">
             <a:avLst/>
@@ -3565,8 +3382,11 @@
           <a:p>
             <a:pPr>
               <a:lnSpc>
-                <a:spcPct val="110000"/>
+                <a:spcPct val="120000"/>
               </a:lnSpc>
+              <a:spcBef>
+                <a:spcPts val="600"/>
+              </a:spcBef>
               <a:defRPr>
                 <a:latin typeface="Helvetica Neue"/>
                 <a:ea typeface="Helvetica Neue"/>
@@ -3575,14 +3395,17 @@
               </a:defRPr>
             </a:pPr>
             <a:r>
-              <a:t>Again we see that a significant speedup is achieved in GPU-enable runs. Indeed, the average speedups of x% for V100 and x% for A100 are both higher their counterparts in the previous section. This is like due to the increased complexity of the matrix and the higher circuit depth demands more system resources and a GPU-enabled run is better at coping with that. We aim to pursue this effect as well in future work. The scaling of the speedup still follows the same pattern as above, and can be attributed to the same reasons.</a:t>
+              <a:t>We checked the results of the simulations by calculating the projection of the obtained result upon the exact solutions. This fidelity was found to average at 0.87 over all conducted runs. </a:t>
             </a:r>
           </a:p>
           <a:p>
             <a:pPr>
               <a:lnSpc>
-                <a:spcPct val="110000"/>
+                <a:spcPct val="120000"/>
               </a:lnSpc>
+              <a:spcBef>
+                <a:spcPts val="600"/>
+              </a:spcBef>
               <a:defRPr>
                 <a:latin typeface="Helvetica Neue"/>
                 <a:ea typeface="Helvetica Neue"/>
@@ -3594,8 +3417,11 @@
           <a:p>
             <a:pPr>
               <a:lnSpc>
-                <a:spcPct val="110000"/>
+                <a:spcPct val="120000"/>
               </a:lnSpc>
+              <a:spcBef>
+                <a:spcPts val="600"/>
+              </a:spcBef>
               <a:defRPr>
                 <a:latin typeface="Helvetica Neue"/>
                 <a:ea typeface="Helvetica Neue"/>
@@ -3604,21 +3430,71 @@
               </a:defRPr>
             </a:pPr>
             <a:r>
-              <a:t>These results demonstrate that one can try and solve actual problems upto a matrix size of 16 X 16. While there are some problems that can be explored at this size, we believe it is possible to further optimise both the implementation of the HHL algorithm and the compatibility with cuQuantum to obtain better speeds and scale these results further. Once that is achieved, we plan to try and apply this to studying physical models like the SSH Model, the Toric Code, etc. </a:t>
+              <a:t>This serves as a demonstration that the HHL algorithm has been implemented correctly and accelerated with cuQuantum. We now move on to matrices where the eigenvalues are not binary fractions and see how the algorithm fares there.</a:t>
             </a:r>
           </a:p>
         </p:txBody>
       </p:sp>
       <p:sp>
         <p:nvSpPr>
-          <p:cNvPr id="69" name="We now move on to working with matrices where the eigenvalues and elements are generated randomly. For such matrices, we start with a diagonal matrix with random entries and then perform the random rotation to make it non-sparse.…"/>
+          <p:cNvPr id="65" name="Rounded Rectangle"/>
+          <p:cNvSpPr/>
+          <p:nvPr/>
+        </p:nvSpPr>
+        <p:spPr>
+          <a:xfrm>
+            <a:off x="17741900" y="5321300"/>
+            <a:ext cx="14185900" cy="5308600"/>
+          </a:xfrm>
+          <a:prstGeom prst="roundRect">
+            <a:avLst>
+              <a:gd name="adj" fmla="val 8236"/>
+            </a:avLst>
+          </a:prstGeom>
+          <a:solidFill>
+            <a:srgbClr val="FFFFFF"/>
+          </a:solidFill>
+          <a:ln w="25400">
+            <a:solidFill>
+              <a:schemeClr val="accent1"/>
+            </a:solidFill>
+          </a:ln>
+          <a:effectLst>
+            <a:outerShdw sx="100000" sy="100000" kx="0" ky="0" algn="b" rotWithShape="0" blurRad="38100" dist="23000" dir="5400000">
+              <a:srgbClr val="000000">
+                <a:alpha val="35000"/>
+              </a:srgbClr>
+            </a:outerShdw>
+          </a:effectLst>
+        </p:spPr>
+        <p:txBody>
+          <a:bodyPr lIns="45719" rIns="45719" anchor="ctr"/>
+          <a:lstStyle/>
+          <a:p>
+            <a:pPr algn="ctr">
+              <a:defRPr sz="6500">
+                <a:solidFill>
+                  <a:srgbClr val="FFFFFF"/>
+                </a:solidFill>
+                <a:latin typeface="Arial"/>
+                <a:ea typeface="Arial"/>
+                <a:cs typeface="Arial"/>
+                <a:sym typeface="Arial"/>
+              </a:defRPr>
+            </a:pPr>
+          </a:p>
+        </p:txBody>
+      </p:sp>
+      <p:sp>
+        <p:nvSpPr>
+          <p:cNvPr id="66" name="Again we see that a significant speedup is achieved in GPU-enable runs. Indeed, the average speedups of 2.86% for V100 and 5.48% for A100 are both higher their counterparts in the previous section. This is likely due to the increased complexity of the ma"/>
           <p:cNvSpPr txBox="1"/>
           <p:nvPr/>
         </p:nvSpPr>
         <p:spPr>
           <a:xfrm>
-            <a:off x="17729200" y="17056100"/>
-            <a:ext cx="14211300" cy="2472589"/>
+            <a:off x="17665700" y="25171400"/>
+            <a:ext cx="14236700" cy="5706802"/>
           </a:xfrm>
           <a:prstGeom prst="rect">
             <a:avLst/>
@@ -3650,7 +3526,7 @@
               </a:defRPr>
             </a:pPr>
             <a:r>
-              <a:t>We now move on to working with matrices where the eigenvalues and elements are generated randomly. For such matrices, we start with a diagonal matrix with random entries and then perform the random rotation to make it non-sparse.</a:t>
+              <a:t>Again we see that a significant speedup is achieved in GPU-enable runs. Indeed, the average speedups of 2.86% for V100 and 5.48% for A100 are both higher their counterparts in the previous section. This is likely due to the increased complexity of the matrix and the higher circuit depth demands more system resources and a GPU-enabled run is better at coping with that. We aim to pursue this effect as well in future work. The scaling of the speedup still follows the same pattern as above, and can be attributed to the same reasons.</a:t>
             </a:r>
           </a:p>
           <a:p>
@@ -3679,100 +3555,21 @@
               </a:defRPr>
             </a:pPr>
             <a:r>
-              <a:t>In such runs the circuit depth has the potential to grow rapidly and take a lot of time. These runs serve to verify that the implementation is viable. The times obtained for these runs are tabulated below.</a:t>
+              <a:t>These results demonstrate that one can try and solve linear systems corresponding to realistic problems with the HHL algorithm. Here we have demonstrated that using up to 12 qubits. We believe it is possible to further increase the system size and optimise both the implementation of the HHL algorithm and the compatibility with cuQuantum to obtain better speeds. We have noticed that a significant amount of time is spent during preprocessing (including transpilation) which restricts the scalability. However, we are actively working on remedying this. Once that is achieved, we plan to apply this to studying physical models related to  quantum many body physics.</a:t>
             </a:r>
           </a:p>
         </p:txBody>
       </p:sp>
       <p:sp>
         <p:nvSpPr>
-          <p:cNvPr id="70" name="Rounded Rectangle"/>
-          <p:cNvSpPr/>
-          <p:nvPr/>
-        </p:nvSpPr>
-        <p:spPr>
-          <a:xfrm>
-            <a:off x="18084800" y="20027900"/>
-            <a:ext cx="13512800" cy="4572000"/>
-          </a:xfrm>
-          <a:prstGeom prst="roundRect">
-            <a:avLst>
-              <a:gd name="adj" fmla="val 9563"/>
-            </a:avLst>
-          </a:prstGeom>
-          <a:solidFill>
-            <a:srgbClr val="FFFFFF"/>
-          </a:solidFill>
-          <a:ln w="25400">
-            <a:solidFill>
-              <a:schemeClr val="accent1"/>
-            </a:solidFill>
-          </a:ln>
-          <a:effectLst>
-            <a:outerShdw sx="100000" sy="100000" kx="0" ky="0" algn="b" rotWithShape="0" blurRad="38100" dist="23000" dir="5400000">
-              <a:srgbClr val="000000">
-                <a:alpha val="35000"/>
-              </a:srgbClr>
-            </a:outerShdw>
-          </a:effectLst>
-        </p:spPr>
-        <p:txBody>
-          <a:bodyPr lIns="45719" rIns="45719" anchor="ctr"/>
-          <a:lstStyle/>
-          <a:p>
-            <a:pPr algn="ctr">
-              <a:defRPr sz="6500">
-                <a:solidFill>
-                  <a:srgbClr val="FFFFFF"/>
-                </a:solidFill>
-                <a:latin typeface="Arial"/>
-                <a:ea typeface="Arial"/>
-                <a:cs typeface="Arial"/>
-                <a:sym typeface="Arial"/>
-              </a:defRPr>
-            </a:pPr>
-          </a:p>
-        </p:txBody>
-      </p:sp>
-      <p:pic>
-        <p:nvPicPr>
-          <p:cNvPr id="71" name="Screenshot_20240123_080500.png" descr="Screenshot_20240123_080500.png"/>
-          <p:cNvPicPr>
-            <a:picLocks noChangeAspect="1"/>
-          </p:cNvPicPr>
-          <p:nvPr/>
-        </p:nvPicPr>
-        <p:blipFill>
-          <a:blip r:embed="rId8">
-            <a:extLst/>
-          </a:blip>
-          <a:stretch>
-            <a:fillRect/>
-          </a:stretch>
-        </p:blipFill>
-        <p:spPr>
-          <a:xfrm>
-            <a:off x="18190987" y="20313422"/>
-            <a:ext cx="13085523" cy="4070578"/>
-          </a:xfrm>
-          <a:prstGeom prst="rect">
-            <a:avLst/>
-          </a:prstGeom>
-          <a:ln w="12700">
-            <a:miter lim="400000"/>
-          </a:ln>
-        </p:spPr>
-      </p:pic>
-      <p:sp>
-        <p:nvSpPr>
-          <p:cNvPr id="72" name="Linear Systems of equations are ubiquitous in all fields of science and often arise as intermediary steps in studies of physical systems. Classical methods for such problems take time that scales polynomially with the problem size.…"/>
+          <p:cNvPr id="67" name="We now move on to working with matrices where the eigenvalues and elements are generated randomly. In this scenario, a diagonal matrix with random entries is generated and then subjected to a random rotation to make it non-sparse.…"/>
           <p:cNvSpPr txBox="1"/>
           <p:nvPr/>
         </p:nvSpPr>
         <p:spPr>
           <a:xfrm>
-            <a:off x="1016000" y="6591300"/>
-            <a:ext cx="14198600" cy="5082338"/>
+            <a:off x="17729200" y="16840200"/>
+            <a:ext cx="14211300" cy="2068312"/>
           </a:xfrm>
           <a:prstGeom prst="rect">
             <a:avLst/>
@@ -3792,15 +3589,10 @@
           </a:bodyPr>
           <a:lstStyle/>
           <a:p>
-            <a:pPr marL="240631" indent="-240631">
+            <a:pPr>
               <a:lnSpc>
-                <a:spcPct val="120000"/>
+                <a:spcPct val="110000"/>
               </a:lnSpc>
-              <a:spcBef>
-                <a:spcPts val="600"/>
-              </a:spcBef>
-              <a:buSzPct val="100000"/>
-              <a:buChar char="•"/>
               <a:defRPr>
                 <a:latin typeface="Helvetica Neue"/>
                 <a:ea typeface="Helvetica Neue"/>
@@ -3809,19 +3601,14 @@
               </a:defRPr>
             </a:pPr>
             <a:r>
-              <a:t>Linear Systems of equations are ubiquitous in all fields of science and often arise as intermediary steps in studies of physical systems. Classical methods for such problems take time that scales polynomially with the problem size.</a:t>
+              <a:t>We now move on to working with matrices where the eigenvalues and elements are generated randomly. In this scenario, a diagonal matrix with random entries is generated and then subjected to a random rotation to make it non-sparse.</a:t>
             </a:r>
           </a:p>
           <a:p>
-            <a:pPr marL="240631" indent="-240631">
+            <a:pPr>
               <a:lnSpc>
-                <a:spcPct val="120000"/>
+                <a:spcPct val="110000"/>
               </a:lnSpc>
-              <a:spcBef>
-                <a:spcPts val="600"/>
-              </a:spcBef>
-              <a:buSzPct val="100000"/>
-              <a:buChar char="•"/>
               <a:defRPr>
                 <a:latin typeface="Helvetica Neue"/>
                 <a:ea typeface="Helvetica Neue"/>
@@ -3830,67 +3617,25 @@
               </a:defRPr>
             </a:pPr>
             <a:r>
-              <a:t>The HHL algorithm [1] is a quantum algorithm that is able to solve such systems in time that that scales logarithmically with the size. Below is a schematic diagram of the quantum circuit corresponding to it.</a:t>
-            </a:r>
-          </a:p>
-          <a:p>
-            <a:pPr marL="240631" indent="-240631">
-              <a:lnSpc>
-                <a:spcPct val="120000"/>
-              </a:lnSpc>
-              <a:spcBef>
-                <a:spcPts val="600"/>
-              </a:spcBef>
-              <a:buSzPct val="100000"/>
-              <a:buChar char="•"/>
-              <a:defRPr>
-                <a:latin typeface="Helvetica Neue"/>
-                <a:ea typeface="Helvetica Neue"/>
-                <a:cs typeface="Helvetica Neue"/>
-                <a:sym typeface="Helvetica Neue"/>
-              </a:defRPr>
-            </a:pPr>
-            <a:r>
-              <a:t>Thus the HHL algorithm can be used to study physical systems more efficiently once satisfactory quantum hardware is fabricated. We aim to use this and other such algorithms for studying quantum many body systems, which are often challenging to study via classical means.</a:t>
-            </a:r>
-          </a:p>
-          <a:p>
-            <a:pPr marL="240631" indent="-240631">
-              <a:lnSpc>
-                <a:spcPct val="120000"/>
-              </a:lnSpc>
-              <a:spcBef>
-                <a:spcPts val="600"/>
-              </a:spcBef>
-              <a:buSzPct val="100000"/>
-              <a:buChar char="•"/>
-              <a:defRPr>
-                <a:latin typeface="Helvetica Neue"/>
-                <a:ea typeface="Helvetica Neue"/>
-                <a:cs typeface="Helvetica Neue"/>
-                <a:sym typeface="Helvetica Neue"/>
-              </a:defRPr>
-            </a:pPr>
-            <a:r>
-              <a:t>Quantum simulation can be used to test and refine the implementation of the algorithm, as well as optimise it for relevant applications. </a:t>
+              <a:t>In such runs the circuit depth is much higher and thus the simulation takes considerable time. The times obtained for these runs are tabulated and plotted below.</a:t>
             </a:r>
           </a:p>
         </p:txBody>
       </p:sp>
       <p:sp>
         <p:nvSpPr>
-          <p:cNvPr id="73" name="Rounded Rectangle"/>
+          <p:cNvPr id="68" name="Rounded Rectangle"/>
           <p:cNvSpPr/>
           <p:nvPr/>
         </p:nvSpPr>
         <p:spPr>
           <a:xfrm>
-            <a:off x="2082800" y="12179300"/>
-            <a:ext cx="12433300" cy="4927600"/>
+            <a:off x="17741900" y="19253200"/>
+            <a:ext cx="14147800" cy="5384800"/>
           </a:xfrm>
           <a:prstGeom prst="roundRect">
             <a:avLst>
-              <a:gd name="adj" fmla="val 8872"/>
+              <a:gd name="adj" fmla="val 8119"/>
             </a:avLst>
           </a:prstGeom>
           <a:solidFill>
@@ -3927,45 +3672,16 @@
           </a:p>
         </p:txBody>
       </p:sp>
-      <p:pic>
-        <p:nvPicPr>
-          <p:cNvPr id="74" name="block.png" descr="block.png"/>
-          <p:cNvPicPr>
-            <a:picLocks noChangeAspect="1"/>
-          </p:cNvPicPr>
-          <p:nvPr/>
-        </p:nvPicPr>
-        <p:blipFill>
-          <a:blip r:embed="rId9">
-            <a:extLst/>
-          </a:blip>
-          <a:stretch>
-            <a:fillRect/>
-          </a:stretch>
-        </p:blipFill>
-        <p:spPr>
-          <a:xfrm>
-            <a:off x="2284757" y="12255628"/>
-            <a:ext cx="11991287" cy="4673601"/>
-          </a:xfrm>
-          <a:prstGeom prst="rect">
-            <a:avLst/>
-          </a:prstGeom>
-          <a:ln w="12700">
-            <a:miter lim="400000"/>
-          </a:ln>
-        </p:spPr>
-      </p:pic>
       <p:sp>
         <p:nvSpPr>
-          <p:cNvPr id="75" name="Further, NVIDIA's cuQuantum SDK allows us to speed up such simulations. It has been demonstrated to provide significant speedups to routine like Shor's Algorithm, the Quantum Fourier Transform, etc. [2,3] to create and we believe it will allow us to bett"/>
+          <p:cNvPr id="69" name="Linear Systems of equations are ubiquitous in all fields of science and often arise as intermediary steps in studies of physical systems. Classical methods for solving such problems take time that scales polynomially with the problem size.…"/>
           <p:cNvSpPr txBox="1"/>
           <p:nvPr/>
         </p:nvSpPr>
         <p:spPr>
           <a:xfrm>
-            <a:off x="990600" y="17665700"/>
-            <a:ext cx="14198600" cy="3685378"/>
+            <a:off x="1016000" y="6591300"/>
+            <a:ext cx="14198600" cy="2288419"/>
           </a:xfrm>
           <a:prstGeom prst="rect">
             <a:avLst/>
@@ -4002,7 +3718,7 @@
               </a:defRPr>
             </a:pPr>
             <a:r>
-              <a:t>Further, NVIDIA's cuQuantum SDK allows us to speed up such simulations. It has been demonstrated to provide significant speedups to routine like Shor's Algorithm, the Quantum Fourier Transform, etc. [2,3] to create and we believe it will allow us to better explore the capabilities for when suitable quantum hardware is available.</a:t>
+              <a:t>Linear Systems of equations are ubiquitous in all fields of science and often arise as intermediary steps in studies of physical systems. Classical methods for solving such problems take time that scales polynomially with the problem size.</a:t>
             </a:r>
           </a:p>
           <a:p>
@@ -4023,9 +3739,118 @@
               </a:defRPr>
             </a:pPr>
             <a:r>
-              <a:t>We thus chose to use cuQuantum to accelerate the simulations of the HHL algorithm with the goal of optimising it and making it scalable to higher system sizes and number of qubits.</a:t>
+              <a:t>The HHL algorithm [1] is a quantum algorithm that is able to solve such systems in time that scales logarithmically with the size. Below is a schematic diagram of the quantum circuit corresponding to it.</a:t>
             </a:r>
           </a:p>
+        </p:txBody>
+      </p:sp>
+      <p:sp>
+        <p:nvSpPr>
+          <p:cNvPr id="70" name="Rounded Rectangle"/>
+          <p:cNvSpPr/>
+          <p:nvPr/>
+        </p:nvSpPr>
+        <p:spPr>
+          <a:xfrm>
+            <a:off x="2082800" y="9537700"/>
+            <a:ext cx="12433300" cy="4927600"/>
+          </a:xfrm>
+          <a:prstGeom prst="roundRect">
+            <a:avLst>
+              <a:gd name="adj" fmla="val 8872"/>
+            </a:avLst>
+          </a:prstGeom>
+          <a:solidFill>
+            <a:srgbClr val="FFFFFF"/>
+          </a:solidFill>
+          <a:ln w="25400">
+            <a:solidFill>
+              <a:schemeClr val="accent1"/>
+            </a:solidFill>
+          </a:ln>
+          <a:effectLst>
+            <a:outerShdw sx="100000" sy="100000" kx="0" ky="0" algn="b" rotWithShape="0" blurRad="38100" dist="23000" dir="5400000">
+              <a:srgbClr val="000000">
+                <a:alpha val="35000"/>
+              </a:srgbClr>
+            </a:outerShdw>
+          </a:effectLst>
+        </p:spPr>
+        <p:txBody>
+          <a:bodyPr lIns="45719" rIns="45719" anchor="ctr"/>
+          <a:lstStyle/>
+          <a:p>
+            <a:pPr algn="ctr">
+              <a:defRPr sz="6500">
+                <a:solidFill>
+                  <a:srgbClr val="FFFFFF"/>
+                </a:solidFill>
+                <a:latin typeface="Arial"/>
+                <a:ea typeface="Arial"/>
+                <a:cs typeface="Arial"/>
+                <a:sym typeface="Arial"/>
+              </a:defRPr>
+            </a:pPr>
+          </a:p>
+        </p:txBody>
+      </p:sp>
+      <p:pic>
+        <p:nvPicPr>
+          <p:cNvPr id="71" name="block.png" descr="block.png"/>
+          <p:cNvPicPr>
+            <a:picLocks noChangeAspect="1"/>
+          </p:cNvPicPr>
+          <p:nvPr/>
+        </p:nvPicPr>
+        <p:blipFill>
+          <a:blip r:embed="rId6">
+            <a:extLst/>
+          </a:blip>
+          <a:stretch>
+            <a:fillRect/>
+          </a:stretch>
+        </p:blipFill>
+        <p:spPr>
+          <a:xfrm>
+            <a:off x="2297457" y="9652128"/>
+            <a:ext cx="11991287" cy="4673601"/>
+          </a:xfrm>
+          <a:prstGeom prst="rect">
+            <a:avLst/>
+          </a:prstGeom>
+          <a:ln w="12700">
+            <a:miter lim="400000"/>
+          </a:ln>
+        </p:spPr>
+      </p:pic>
+      <p:sp>
+        <p:nvSpPr>
+          <p:cNvPr id="72" name="The HHL algorithm can be employed solve large linear systems and hence investigate physical systems more efficiently once satisfactory quantum hardware is available. We aim to use this and other such algorithms for studying quantum many body systems, whi"/>
+          <p:cNvSpPr txBox="1"/>
+          <p:nvPr/>
+        </p:nvSpPr>
+        <p:spPr>
+          <a:xfrm>
+            <a:off x="990600" y="14998700"/>
+            <a:ext cx="14198600" cy="5522591"/>
+          </a:xfrm>
+          <a:prstGeom prst="rect">
+            <a:avLst/>
+          </a:prstGeom>
+          <a:ln w="12700">
+            <a:miter lim="400000"/>
+          </a:ln>
+          <a:extLst>
+            <a:ext uri="{C572A759-6A51-4108-AA02-DFA0A04FC94B}">
+              <ma14:wrappingTextBoxFlag xmlns:ma14="http://schemas.microsoft.com/office/mac/drawingml/2011/main" val="1"/>
+            </a:ext>
+          </a:extLst>
+        </p:spPr>
+        <p:txBody>
+          <a:bodyPr lIns="45719" rIns="45719">
+            <a:spAutoFit/>
+          </a:bodyPr>
+          <a:lstStyle/>
           <a:p>
             <a:pPr marL="240631" indent="-240631">
               <a:lnSpc>
@@ -4044,14 +3869,77 @@
               </a:defRPr>
             </a:pPr>
             <a:r>
-              <a:t>In this poster, we present results regarding the implementation of the HHL algorithm and the speedups gained by GPU enablement via cuQuantum.</a:t>
+              <a:t>The HHL algorithm can be employed solve large linear systems and hence investigate physical systems more efficiently once satisfactory quantum hardware is available. We aim to use this and other such algorithms for studying quantum many body systems, which are often challenging to study via classical means.</a:t>
+            </a:r>
+          </a:p>
+          <a:p>
+            <a:pPr marL="240631" indent="-240631">
+              <a:lnSpc>
+                <a:spcPct val="120000"/>
+              </a:lnSpc>
+              <a:spcBef>
+                <a:spcPts val="600"/>
+              </a:spcBef>
+              <a:buSzPct val="100000"/>
+              <a:buChar char="•"/>
+              <a:defRPr>
+                <a:latin typeface="Helvetica Neue"/>
+                <a:ea typeface="Helvetica Neue"/>
+                <a:cs typeface="Helvetica Neue"/>
+                <a:sym typeface="Helvetica Neue"/>
+              </a:defRPr>
+            </a:pPr>
+            <a:r>
+              <a:t>Further, NVIDIA's cuQuantum SDK allows us to speed up such simulations using GPUs. It has been demonstrated to provide significant speedups to routine like Shor's Algorithm, the Quantum Fourier Transform, and Sycamore [2,3]. We believe that cuQuantum will allow us to exploit classical hardware for quantum simulation and be quantum ready when the requisite quantum hardware is available.</a:t>
+            </a:r>
+          </a:p>
+          <a:p>
+            <a:pPr marL="240631" indent="-240631">
+              <a:lnSpc>
+                <a:spcPct val="120000"/>
+              </a:lnSpc>
+              <a:spcBef>
+                <a:spcPts val="600"/>
+              </a:spcBef>
+              <a:buSzPct val="100000"/>
+              <a:buChar char="•"/>
+              <a:defRPr>
+                <a:latin typeface="Helvetica Neue"/>
+                <a:ea typeface="Helvetica Neue"/>
+                <a:cs typeface="Helvetica Neue"/>
+                <a:sym typeface="Helvetica Neue"/>
+              </a:defRPr>
+            </a:pPr>
+            <a:r>
+              <a:t>The HHL algorithm is implemented with cuQuantum with the goal of performance optimisation and making it scalable to higher system sizes and number of qubits.</a:t>
+            </a:r>
+          </a:p>
+          <a:p>
+            <a:pPr marL="240631" indent="-240631">
+              <a:lnSpc>
+                <a:spcPct val="120000"/>
+              </a:lnSpc>
+              <a:spcBef>
+                <a:spcPts val="600"/>
+              </a:spcBef>
+              <a:buSzPct val="100000"/>
+              <a:buChar char="•"/>
+              <a:defRPr>
+                <a:latin typeface="Helvetica Neue"/>
+                <a:ea typeface="Helvetica Neue"/>
+                <a:cs typeface="Helvetica Neue"/>
+                <a:sym typeface="Helvetica Neue"/>
+              </a:defRPr>
+            </a:pPr>
+            <a:r>
+              <a:t>In this work, we present initial results obtained from the implementation of the HHL algorithm and the speedups gained by GPU enablement.</a:t>
             </a:r>
           </a:p>
         </p:txBody>
       </p:sp>
       <p:sp>
         <p:nvSpPr>
-          <p:cNvPr id="76" name="Rectangle: Rounded Corners 38"/>
+          <p:cNvPr id="73" name="Rectangle: Rounded Corners 38"/>
           <p:cNvSpPr/>
           <p:nvPr/>
         </p:nvSpPr>
@@ -4094,7 +3982,7 @@
       </p:sp>
       <p:sp>
         <p:nvSpPr>
-          <p:cNvPr id="77" name="TextBox 46"/>
+          <p:cNvPr id="74" name="TextBox 46"/>
           <p:cNvSpPr txBox="1"/>
           <p:nvPr/>
         </p:nvSpPr>
@@ -4140,6 +4028,180 @@
           </a:p>
         </p:txBody>
       </p:sp>
+      <p:pic>
+        <p:nvPicPr>
+          <p:cNvPr id="75" name="diag.png" descr="diag.png"/>
+          <p:cNvPicPr>
+            <a:picLocks noChangeAspect="1"/>
+          </p:cNvPicPr>
+          <p:nvPr/>
+        </p:nvPicPr>
+        <p:blipFill>
+          <a:blip r:embed="rId7">
+            <a:extLst/>
+          </a:blip>
+          <a:stretch>
+            <a:fillRect/>
+          </a:stretch>
+        </p:blipFill>
+        <p:spPr>
+          <a:xfrm>
+            <a:off x="1532037" y="27514844"/>
+            <a:ext cx="6651427" cy="3238501"/>
+          </a:xfrm>
+          <a:prstGeom prst="rect">
+            <a:avLst/>
+          </a:prstGeom>
+          <a:ln w="12700">
+            <a:miter lim="400000"/>
+          </a:ln>
+        </p:spPr>
+      </p:pic>
+      <p:pic>
+        <p:nvPicPr>
+          <p:cNvPr id="76" name="diag.png" descr="diag.png"/>
+          <p:cNvPicPr>
+            <a:picLocks noChangeAspect="1"/>
+          </p:cNvPicPr>
+          <p:nvPr/>
+        </p:nvPicPr>
+        <p:blipFill>
+          <a:blip r:embed="rId8">
+            <a:extLst/>
+          </a:blip>
+          <a:stretch>
+            <a:fillRect/>
+          </a:stretch>
+        </p:blipFill>
+        <p:spPr>
+          <a:xfrm>
+            <a:off x="8369300" y="26720800"/>
+            <a:ext cx="6368251" cy="4978400"/>
+          </a:xfrm>
+          <a:prstGeom prst="rect">
+            <a:avLst/>
+          </a:prstGeom>
+          <a:ln w="12700">
+            <a:miter lim="400000"/>
+          </a:ln>
+        </p:spPr>
+      </p:pic>
+      <p:pic>
+        <p:nvPicPr>
+          <p:cNvPr id="77" name="diagr.png" descr="diagr.png"/>
+          <p:cNvPicPr>
+            <a:picLocks noChangeAspect="1"/>
+          </p:cNvPicPr>
+          <p:nvPr/>
+        </p:nvPicPr>
+        <p:blipFill>
+          <a:blip r:embed="rId9">
+            <a:extLst/>
+          </a:blip>
+          <a:stretch>
+            <a:fillRect/>
+          </a:stretch>
+        </p:blipFill>
+        <p:spPr>
+          <a:xfrm>
+            <a:off x="24862792" y="5432578"/>
+            <a:ext cx="6489701" cy="5073344"/>
+          </a:xfrm>
+          <a:prstGeom prst="rect">
+            <a:avLst/>
+          </a:prstGeom>
+          <a:ln w="12700">
+            <a:miter lim="400000"/>
+          </a:ln>
+        </p:spPr>
+      </p:pic>
+      <p:pic>
+        <p:nvPicPr>
+          <p:cNvPr id="78" name="diagr.png" descr="diagr.png"/>
+          <p:cNvPicPr>
+            <a:picLocks noChangeAspect="1"/>
+          </p:cNvPicPr>
+          <p:nvPr/>
+        </p:nvPicPr>
+        <p:blipFill>
+          <a:blip r:embed="rId10">
+            <a:extLst/>
+          </a:blip>
+          <a:stretch>
+            <a:fillRect/>
+          </a:stretch>
+        </p:blipFill>
+        <p:spPr>
+          <a:xfrm>
+            <a:off x="17843500" y="6337344"/>
+            <a:ext cx="6908800" cy="3086012"/>
+          </a:xfrm>
+          <a:prstGeom prst="rect">
+            <a:avLst/>
+          </a:prstGeom>
+          <a:ln w="12700">
+            <a:miter lim="400000"/>
+          </a:ln>
+        </p:spPr>
+      </p:pic>
+      <p:pic>
+        <p:nvPicPr>
+          <p:cNvPr id="79" name="gen.png" descr="gen.png"/>
+          <p:cNvPicPr>
+            <a:picLocks noChangeAspect="1"/>
+          </p:cNvPicPr>
+          <p:nvPr/>
+        </p:nvPicPr>
+        <p:blipFill>
+          <a:blip r:embed="rId11">
+            <a:extLst/>
+          </a:blip>
+          <a:stretch>
+            <a:fillRect/>
+          </a:stretch>
+        </p:blipFill>
+        <p:spPr>
+          <a:xfrm>
+            <a:off x="17907000" y="20059871"/>
+            <a:ext cx="7023100" cy="3339657"/>
+          </a:xfrm>
+          <a:prstGeom prst="rect">
+            <a:avLst/>
+          </a:prstGeom>
+          <a:ln w="12700">
+            <a:miter lim="400000"/>
+          </a:ln>
+        </p:spPr>
+      </p:pic>
+      <p:pic>
+        <p:nvPicPr>
+          <p:cNvPr id="80" name="gen.png" descr="gen.png"/>
+          <p:cNvPicPr>
+            <a:picLocks noChangeAspect="1"/>
+          </p:cNvPicPr>
+          <p:nvPr/>
+        </p:nvPicPr>
+        <p:blipFill>
+          <a:blip r:embed="rId12">
+            <a:extLst/>
+          </a:blip>
+          <a:stretch>
+            <a:fillRect/>
+          </a:stretch>
+        </p:blipFill>
+        <p:spPr>
+          <a:xfrm>
+            <a:off x="25161214" y="19441836"/>
+            <a:ext cx="6468108" cy="5056464"/>
+          </a:xfrm>
+          <a:prstGeom prst="rect">
+            <a:avLst/>
+          </a:prstGeom>
+          <a:ln w="12700">
+            <a:miter lim="400000"/>
+          </a:ln>
+        </p:spPr>
+      </p:pic>
     </p:spTree>
   </p:cSld>
   <p:clrMapOvr>

</xml_diff>